<commit_message>
Completed Spark exercises and answers Updated Java exercises to use vagrant IP address
</commit_message>
<xml_diff>
--- a/geo/courseware/Geo.pptx
+++ b/geo/courseware/Geo.pptx
@@ -289,7 +289,7 @@
               <a:pPr>
                 <a:defRPr/>
               </a:pPr>
-              <a:t>8/11/16</a:t>
+              <a:t>8/12/16</a:t>
             </a:fld>
             <a:endParaRPr lang="en-US" dirty="0"/>
           </a:p>
@@ -505,7 +505,7 @@
               <a:pPr>
                 <a:defRPr/>
               </a:pPr>
-              <a:t>8/11/16</a:t>
+              <a:t>8/12/16</a:t>
             </a:fld>
             <a:endParaRPr lang="en-US" dirty="0"/>
           </a:p>
@@ -998,12 +998,12 @@
           <a:graphicData uri="http://schemas.openxmlformats.org/presentationml/2006/ole">
             <mc:AlternateContent xmlns:mc="http://schemas.openxmlformats.org/markup-compatibility/2006">
               <mc:Choice xmlns:v="urn:schemas-microsoft-com:vml" Requires="v">
-                <p:oleObj spid="_x0000_s5379" name="Document" r:id="rId4" imgW="8229600" imgH="558800" progId="Word.Document.12">
+                <p:oleObj spid="_x0000_s5382" name="Document" r:id="rId5" imgW="8229600" imgH="558800" progId="Word.Document.12">
                   <p:embed/>
                 </p:oleObj>
               </mc:Choice>
               <mc:Fallback>
-                <p:oleObj name="Document" r:id="rId4" imgW="8229600" imgH="558800" progId="Word.Document.12">
+                <p:oleObj name="Document" r:id="rId5" imgW="8229600" imgH="558800" progId="Word.Document.12">
                   <p:embed/>
                   <p:pic>
                     <p:nvPicPr>
@@ -1012,7 +1012,7 @@
                       <p:nvPr/>
                     </p:nvPicPr>
                     <p:blipFill>
-                      <a:blip r:embed="rId5"/>
+                      <a:blip r:embed="rId6"/>
                       <a:stretch>
                         <a:fillRect/>
                       </a:stretch>
@@ -1051,12 +1051,12 @@
           <a:graphicData uri="http://schemas.openxmlformats.org/presentationml/2006/ole">
             <mc:AlternateContent xmlns:mc="http://schemas.openxmlformats.org/markup-compatibility/2006">
               <mc:Choice xmlns:v="urn:schemas-microsoft-com:vml" Requires="v">
-                <p:oleObj spid="_x0000_s5380" name="Document" r:id="rId6" imgW="8229600" imgH="1117600" progId="Word.Document.12">
+                <p:oleObj spid="_x0000_s5383" name="Document" r:id="rId8" imgW="8229600" imgH="1117600" progId="Word.Document.12">
                   <p:embed/>
                 </p:oleObj>
               </mc:Choice>
               <mc:Fallback>
-                <p:oleObj name="Document" r:id="rId6" imgW="8229600" imgH="1117600" progId="Word.Document.12">
+                <p:oleObj name="Document" r:id="rId8" imgW="8229600" imgH="1117600" progId="Word.Document.12">
                   <p:embed/>
                   <p:pic>
                     <p:nvPicPr>
@@ -1065,7 +1065,7 @@
                       <p:nvPr/>
                     </p:nvPicPr>
                     <p:blipFill>
-                      <a:blip r:embed="rId7"/>
+                      <a:blip r:embed="rId9"/>
                       <a:stretch>
                         <a:fillRect/>
                       </a:stretch>
@@ -1856,12 +1856,12 @@
           <a:graphicData uri="http://schemas.openxmlformats.org/presentationml/2006/ole">
             <mc:AlternateContent xmlns:mc="http://schemas.openxmlformats.org/markup-compatibility/2006">
               <mc:Choice xmlns:v="urn:schemas-microsoft-com:vml" Requires="v">
-                <p:oleObj spid="_x0000_s3331" name="Document" r:id="rId4" imgW="8229600" imgH="558800" progId="Word.Document.12">
+                <p:oleObj spid="_x0000_s3334" name="Document" r:id="rId5" imgW="8229600" imgH="558800" progId="Word.Document.12">
                   <p:embed/>
                 </p:oleObj>
               </mc:Choice>
               <mc:Fallback>
-                <p:oleObj name="Document" r:id="rId4" imgW="8229600" imgH="558800" progId="Word.Document.12">
+                <p:oleObj name="Document" r:id="rId5" imgW="8229600" imgH="558800" progId="Word.Document.12">
                   <p:embed/>
                   <p:pic>
                     <p:nvPicPr>
@@ -1870,7 +1870,7 @@
                       <p:nvPr/>
                     </p:nvPicPr>
                     <p:blipFill>
-                      <a:blip r:embed="rId5"/>
+                      <a:blip r:embed="rId6"/>
                       <a:stretch>
                         <a:fillRect/>
                       </a:stretch>
@@ -1909,12 +1909,12 @@
           <a:graphicData uri="http://schemas.openxmlformats.org/presentationml/2006/ole">
             <mc:AlternateContent xmlns:mc="http://schemas.openxmlformats.org/markup-compatibility/2006">
               <mc:Choice xmlns:v="urn:schemas-microsoft-com:vml" Requires="v">
-                <p:oleObj spid="_x0000_s3332" name="Document" r:id="rId6" imgW="5486400" imgH="927100" progId="Word.Document.12">
+                <p:oleObj spid="_x0000_s3335" name="Document" r:id="rId8" imgW="5486400" imgH="927100" progId="Word.Document.12">
                   <p:embed/>
                 </p:oleObj>
               </mc:Choice>
               <mc:Fallback>
-                <p:oleObj name="Document" r:id="rId6" imgW="5486400" imgH="927100" progId="Word.Document.12">
+                <p:oleObj name="Document" r:id="rId8" imgW="5486400" imgH="927100" progId="Word.Document.12">
                   <p:embed/>
                   <p:pic>
                     <p:nvPicPr>
@@ -1923,7 +1923,7 @@
                       <p:nvPr/>
                     </p:nvPicPr>
                     <p:blipFill>
-                      <a:blip r:embed="rId7"/>
+                      <a:blip r:embed="rId9"/>
                       <a:stretch>
                         <a:fillRect/>
                       </a:stretch>
@@ -3085,7 +3085,7 @@
           <a:p>
             <a:fld id="{1F322805-1C3E-D64D-B9FF-1838A69DCBD5}" type="datetimeFigureOut">
               <a:rPr lang="en-US" smtClean="0"/>
-              <a:t>8/11/16</a:t>
+              <a:t>8/12/16</a:t>
             </a:fld>
             <a:endParaRPr lang="en-US"/>
           </a:p>
@@ -4090,7 +4090,7 @@
           <a:p>
             <a:fld id="{5572DC24-C402-654F-AFF6-A88DF25963D2}" type="datetimeFigureOut">
               <a:rPr lang="en-US" smtClean="0"/>
-              <a:t>8/11/16</a:t>
+              <a:t>8/12/16</a:t>
             </a:fld>
             <a:endParaRPr lang="en-US"/>
           </a:p>
@@ -7222,12 +7222,12 @@
           <a:graphicData uri="http://schemas.openxmlformats.org/presentationml/2006/ole">
             <mc:AlternateContent xmlns:mc="http://schemas.openxmlformats.org/markup-compatibility/2006">
               <mc:Choice xmlns:v="urn:schemas-microsoft-com:vml" Requires="v">
-                <p:oleObj spid="_x0000_s10421" name="Document" r:id="rId4" imgW="8229600" imgH="1485900" progId="Word.Document.12">
+                <p:oleObj spid="_x0000_s10424" name="Document" r:id="rId5" imgW="8229600" imgH="1485900" progId="Word.Document.12">
                   <p:embed/>
                 </p:oleObj>
               </mc:Choice>
               <mc:Fallback>
-                <p:oleObj name="Document" r:id="rId4" imgW="8229600" imgH="1485900" progId="Word.Document.12">
+                <p:oleObj name="Document" r:id="rId5" imgW="8229600" imgH="1485900" progId="Word.Document.12">
                   <p:embed/>
                   <p:pic>
                     <p:nvPicPr>
@@ -7236,7 +7236,7 @@
                       <p:nvPr/>
                     </p:nvPicPr>
                     <p:blipFill>
-                      <a:blip r:embed="rId5"/>
+                      <a:blip r:embed="rId6"/>
                       <a:stretch>
                         <a:fillRect/>
                       </a:stretch>
@@ -7275,12 +7275,12 @@
           <a:graphicData uri="http://schemas.openxmlformats.org/presentationml/2006/ole">
             <mc:AlternateContent xmlns:mc="http://schemas.openxmlformats.org/markup-compatibility/2006">
               <mc:Choice xmlns:v="urn:schemas-microsoft-com:vml" Requires="v">
-                <p:oleObj spid="_x0000_s10422" name="Document" r:id="rId6" imgW="8229600" imgH="1308100" progId="Word.Document.12">
+                <p:oleObj spid="_x0000_s10425" name="Document" r:id="rId8" imgW="8229600" imgH="1308100" progId="Word.Document.12">
                   <p:embed/>
                 </p:oleObj>
               </mc:Choice>
               <mc:Fallback>
-                <p:oleObj name="Document" r:id="rId6" imgW="8229600" imgH="1308100" progId="Word.Document.12">
+                <p:oleObj name="Document" r:id="rId8" imgW="8229600" imgH="1308100" progId="Word.Document.12">
                   <p:embed/>
                   <p:pic>
                     <p:nvPicPr>
@@ -7289,7 +7289,7 @@
                       <p:nvPr/>
                     </p:nvPicPr>
                     <p:blipFill>
-                      <a:blip r:embed="rId7"/>
+                      <a:blip r:embed="rId9"/>
                       <a:stretch>
                         <a:fillRect/>
                       </a:stretch>
@@ -8220,11 +8220,7 @@
           <a:p>
             <a:r>
               <a:rPr lang="en-US" dirty="0" smtClean="0"/>
-              <a:t>Java: </a:t>
-            </a:r>
-            <a:r>
-              <a:rPr lang="en-US" dirty="0" smtClean="0"/>
-              <a:t>Geospatial</a:t>
+              <a:t>Java: Geospatial</a:t>
             </a:r>
             <a:endParaRPr lang="en-US" dirty="0"/>
           </a:p>
@@ -8248,7 +8244,7 @@
         </p:spPr>
         <p:txBody>
           <a:bodyPr>
-            <a:normAutofit fontScale="92500" lnSpcReduction="20000"/>
+            <a:normAutofit fontScale="85000" lnSpcReduction="10000"/>
           </a:bodyPr>
           <a:lstStyle/>
           <a:p>
@@ -8261,11 +8257,19 @@
             </a:r>
             <a:r>
               <a:rPr lang="en-US" sz="2000" dirty="0" err="1" smtClean="0"/>
-              <a:t>Program.java</a:t>
+              <a:t>GeoExercises</a:t>
+            </a:r>
+            <a:r>
+              <a:rPr lang="en-US" sz="2000" dirty="0" err="1" smtClean="0"/>
+              <a:t>.java</a:t>
             </a:r>
             <a:r>
               <a:rPr lang="en-US" sz="2000" dirty="0" smtClean="0"/>
-              <a:t> file in the exercises directory. Replace the TODOs with working code</a:t>
+              <a:t> </a:t>
+            </a:r>
+            <a:r>
+              <a:rPr lang="en-US" sz="2000" dirty="0" smtClean="0"/>
+              <a:t>file in the exercises directory. Replace the TODOs with working code</a:t>
             </a:r>
           </a:p>
           <a:p>
@@ -8465,7 +8469,6 @@
               <a:rPr lang="en-US" dirty="0"/>
               <a:t>Geospatial</a:t>
             </a:r>
-            <a:endParaRPr lang="en-US" dirty="0"/>
           </a:p>
         </p:txBody>
       </p:sp>
@@ -8794,30 +8797,14 @@
             <a:pPr marL="681037" lvl="0" indent="-342900"/>
             <a:r>
               <a:rPr lang="en-US" dirty="0" smtClean="0"/>
-              <a:t>Create </a:t>
-            </a:r>
-            <a:r>
-              <a:rPr lang="en-US" dirty="0" smtClean="0"/>
-              <a:t>Geospatial </a:t>
-            </a:r>
-            <a:r>
-              <a:rPr lang="en-US" dirty="0" smtClean="0"/>
-              <a:t>Indices</a:t>
+              <a:t>Create Geospatial Indices</a:t>
             </a:r>
           </a:p>
           <a:p>
             <a:pPr marL="681037" lvl="0" indent="-342900"/>
             <a:r>
               <a:rPr lang="en-US" baseline="0" dirty="0" smtClean="0"/>
-              <a:t>Perform </a:t>
-            </a:r>
-            <a:r>
-              <a:rPr lang="en-US" baseline="0" dirty="0" smtClean="0"/>
-              <a:t>Geospatial </a:t>
-            </a:r>
-            <a:r>
-              <a:rPr lang="en-US" baseline="0" dirty="0" smtClean="0"/>
-              <a:t>Queries</a:t>
+              <a:t>Perform Geospatial Queries</a:t>
             </a:r>
           </a:p>
           <a:p>
@@ -9297,27 +9284,11 @@
             </a:r>
             <a:r>
               <a:rPr lang="en-US" dirty="0" smtClean="0"/>
-              <a:t>by discovering </a:t>
-            </a:r>
-            <a:r>
-              <a:rPr lang="en-US" dirty="0" smtClean="0"/>
-              <a:t>persons or devices within the </a:t>
+              <a:t>by discovering persons or devices within the </a:t>
             </a:r>
             <a:r>
               <a:rPr lang="en-US" smtClean="0"/>
-              <a:t>location </a:t>
-            </a:r>
-            <a:r>
-              <a:rPr lang="en-US" smtClean="0"/>
-              <a:t>of an </a:t>
-            </a:r>
-            <a:r>
-              <a:rPr lang="en-US" smtClean="0"/>
-              <a:t>active </a:t>
-            </a:r>
-            <a:r>
-              <a:rPr lang="en-US" smtClean="0"/>
-              <a:t>Ad </a:t>
+              <a:t>location of an active Ad </a:t>
             </a:r>
             <a:r>
               <a:rPr lang="en-US" dirty="0" smtClean="0"/>
@@ -9558,15 +9529,7 @@
                   <a:srgbClr val="0000FF"/>
                 </a:solidFill>
               </a:rPr>
-              <a:t>within </a:t>
-            </a:r>
-            <a:r>
-              <a:rPr lang="en-US" b="1" dirty="0" smtClean="0">
-                <a:solidFill>
-                  <a:srgbClr val="0000FF"/>
-                </a:solidFill>
-              </a:rPr>
-              <a:t>500m </a:t>
+              <a:t>within 500m </a:t>
             </a:r>
             <a:r>
               <a:rPr lang="en-US" dirty="0" smtClean="0"/>
@@ -9659,11 +9622,7 @@
           <a:p>
             <a:r>
               <a:rPr lang="en-US" dirty="0" smtClean="0"/>
-              <a:t>Geospatial </a:t>
-            </a:r>
-            <a:r>
-              <a:rPr lang="en-US" dirty="0" smtClean="0"/>
-              <a:t>terms</a:t>
+              <a:t>Geospatial terms</a:t>
             </a:r>
             <a:endParaRPr lang="en-US" dirty="0"/>
           </a:p>
@@ -10376,10 +10335,6 @@
               <a:rPr lang="en-US" sz="1400" dirty="0" smtClean="0"/>
               <a:t>(not supported by Aerospike)</a:t>
             </a:r>
-            <a:r>
-              <a:rPr lang="en-US" sz="1400" dirty="0" smtClean="0"/>
-              <a:t/>
-            </a:r>
             <a:br>
               <a:rPr lang="en-US" sz="1400" dirty="0" smtClean="0"/>
             </a:br>
@@ -10416,11 +10371,7 @@
             <a:pPr lvl="1"/>
             <a:r>
               <a:rPr lang="en-US" dirty="0" smtClean="0"/>
-              <a:t>Geometries - </a:t>
-            </a:r>
-            <a:r>
-              <a:rPr lang="en-US" dirty="0" smtClean="0"/>
-              <a:t>Points, </a:t>
+              <a:t>Geometries - Points, </a:t>
             </a:r>
             <a:r>
               <a:rPr lang="en-US" dirty="0" err="1" smtClean="0"/>
@@ -10430,17 +10381,12 @@
               <a:rPr lang="en-US" dirty="0" smtClean="0"/>
               <a:t>, Polygons</a:t>
             </a:r>
-            <a:endParaRPr lang="en-US" dirty="0" smtClean="0"/>
           </a:p>
           <a:p>
             <a:pPr lvl="1"/>
             <a:r>
               <a:rPr lang="en-US" dirty="0" smtClean="0"/>
               <a:t>Properties – data about the feature</a:t>
-            </a:r>
-            <a:r>
-              <a:rPr lang="en-US" dirty="0" smtClean="0"/>
-              <a:t/>
             </a:r>
             <a:br>
               <a:rPr lang="en-US" dirty="0" smtClean="0"/>
@@ -12093,11 +12039,6 @@
               </a:rPr>
               <a:t> </a:t>
             </a:r>
-            <a:endParaRPr lang="en-US" sz="1200" dirty="0" smtClean="0">
-              <a:solidFill>
-                <a:srgbClr val="BBBBBB"/>
-              </a:solidFill>
-            </a:endParaRPr>
           </a:p>
           <a:p>
             <a:r>
@@ -12184,11 +12125,6 @@
               </a:rPr>
               <a:t> </a:t>
             </a:r>
-            <a:endParaRPr lang="en-US" sz="1200" dirty="0" smtClean="0">
-              <a:solidFill>
-                <a:srgbClr val="BBBBBB"/>
-              </a:solidFill>
-            </a:endParaRPr>
           </a:p>
           <a:p>
             <a:r>
@@ -12459,12 +12395,12 @@
           <a:graphicData uri="http://schemas.openxmlformats.org/presentationml/2006/ole">
             <mc:AlternateContent xmlns:mc="http://schemas.openxmlformats.org/markup-compatibility/2006">
               <mc:Choice xmlns:v="urn:schemas-microsoft-com:vml" Requires="v">
-                <p:oleObj spid="_x0000_s8294" name="Document" r:id="rId4" imgW="8229600" imgH="1587500" progId="Word.Document.12">
+                <p:oleObj spid="_x0000_s8296" name="Document" r:id="rId5" imgW="8229600" imgH="1587500" progId="Word.Document.12">
                   <p:embed/>
                 </p:oleObj>
               </mc:Choice>
               <mc:Fallback>
-                <p:oleObj name="Document" r:id="rId4" imgW="8229600" imgH="1587500" progId="Word.Document.12">
+                <p:oleObj name="Document" r:id="rId5" imgW="8229600" imgH="1587500" progId="Word.Document.12">
                   <p:embed/>
                   <p:pic>
                     <p:nvPicPr>
@@ -12473,7 +12409,7 @@
                       <p:nvPr/>
                     </p:nvPicPr>
                     <p:blipFill>
-                      <a:blip r:embed="rId5"/>
+                      <a:blip r:embed="rId6"/>
                       <a:stretch>
                         <a:fillRect/>
                       </a:stretch>
@@ -12503,7 +12439,7 @@
           <p:nvPr/>
         </p:nvPicPr>
         <p:blipFill>
-          <a:blip r:embed="rId6">
+          <a:blip r:embed="rId7">
             <a:extLst>
               <a:ext uri="{28A0092B-C50C-407E-A947-70E740481C1C}">
                 <a14:useLocalDpi xmlns:a14="http://schemas.microsoft.com/office/drawing/2010/main" val="0"/>

</xml_diff>